<commit_message>
Jupyter notebook to get the data and put in db - first pass
</commit_message>
<xml_diff>
--- a/Boot Camp Project 2 Proposal.pptx
+++ b/Boot Camp Project 2 Proposal.pptx
@@ -10,6 +10,7 @@
     <p:sldId id="259" r:id="rId4"/>
     <p:sldId id="258" r:id="rId5"/>
     <p:sldId id="260" r:id="rId6"/>
+    <p:sldId id="261" r:id="rId7"/>
   </p:sldIdLst>
   <p:sldSz cx="9144000" cy="6858000" type="screen4x3"/>
   <p:notesSz cx="6858000" cy="9144000"/>
@@ -292,7 +293,7 @@
           <a:p>
             <a:fld id="{E28ACE04-117D-4890-80E4-254974542FBA}" type="datetimeFigureOut">
               <a:rPr lang="en-US" smtClean="0"/>
-              <a:t>3/30/2019</a:t>
+              <a:t>3/31/2019</a:t>
             </a:fld>
             <a:endParaRPr lang="en-US"/>
           </a:p>
@@ -462,7 +463,7 @@
           <a:p>
             <a:fld id="{E28ACE04-117D-4890-80E4-254974542FBA}" type="datetimeFigureOut">
               <a:rPr lang="en-US" smtClean="0"/>
-              <a:t>3/30/2019</a:t>
+              <a:t>3/31/2019</a:t>
             </a:fld>
             <a:endParaRPr lang="en-US"/>
           </a:p>
@@ -642,7 +643,7 @@
           <a:p>
             <a:fld id="{E28ACE04-117D-4890-80E4-254974542FBA}" type="datetimeFigureOut">
               <a:rPr lang="en-US" smtClean="0"/>
-              <a:t>3/30/2019</a:t>
+              <a:t>3/31/2019</a:t>
             </a:fld>
             <a:endParaRPr lang="en-US"/>
           </a:p>
@@ -812,7 +813,7 @@
           <a:p>
             <a:fld id="{E28ACE04-117D-4890-80E4-254974542FBA}" type="datetimeFigureOut">
               <a:rPr lang="en-US" smtClean="0"/>
-              <a:t>3/30/2019</a:t>
+              <a:t>3/31/2019</a:t>
             </a:fld>
             <a:endParaRPr lang="en-US"/>
           </a:p>
@@ -1058,7 +1059,7 @@
           <a:p>
             <a:fld id="{E28ACE04-117D-4890-80E4-254974542FBA}" type="datetimeFigureOut">
               <a:rPr lang="en-US" smtClean="0"/>
-              <a:t>3/30/2019</a:t>
+              <a:t>3/31/2019</a:t>
             </a:fld>
             <a:endParaRPr lang="en-US"/>
           </a:p>
@@ -1346,7 +1347,7 @@
           <a:p>
             <a:fld id="{E28ACE04-117D-4890-80E4-254974542FBA}" type="datetimeFigureOut">
               <a:rPr lang="en-US" smtClean="0"/>
-              <a:t>3/30/2019</a:t>
+              <a:t>3/31/2019</a:t>
             </a:fld>
             <a:endParaRPr lang="en-US"/>
           </a:p>
@@ -1768,7 +1769,7 @@
           <a:p>
             <a:fld id="{E28ACE04-117D-4890-80E4-254974542FBA}" type="datetimeFigureOut">
               <a:rPr lang="en-US" smtClean="0"/>
-              <a:t>3/30/2019</a:t>
+              <a:t>3/31/2019</a:t>
             </a:fld>
             <a:endParaRPr lang="en-US"/>
           </a:p>
@@ -1886,7 +1887,7 @@
           <a:p>
             <a:fld id="{E28ACE04-117D-4890-80E4-254974542FBA}" type="datetimeFigureOut">
               <a:rPr lang="en-US" smtClean="0"/>
-              <a:t>3/30/2019</a:t>
+              <a:t>3/31/2019</a:t>
             </a:fld>
             <a:endParaRPr lang="en-US"/>
           </a:p>
@@ -1981,7 +1982,7 @@
           <a:p>
             <a:fld id="{E28ACE04-117D-4890-80E4-254974542FBA}" type="datetimeFigureOut">
               <a:rPr lang="en-US" smtClean="0"/>
-              <a:t>3/30/2019</a:t>
+              <a:t>3/31/2019</a:t>
             </a:fld>
             <a:endParaRPr lang="en-US"/>
           </a:p>
@@ -2258,7 +2259,7 @@
           <a:p>
             <a:fld id="{E28ACE04-117D-4890-80E4-254974542FBA}" type="datetimeFigureOut">
               <a:rPr lang="en-US" smtClean="0"/>
-              <a:t>3/30/2019</a:t>
+              <a:t>3/31/2019</a:t>
             </a:fld>
             <a:endParaRPr lang="en-US"/>
           </a:p>
@@ -2511,7 +2512,7 @@
           <a:p>
             <a:fld id="{E28ACE04-117D-4890-80E4-254974542FBA}" type="datetimeFigureOut">
               <a:rPr lang="en-US" smtClean="0"/>
-              <a:t>3/30/2019</a:t>
+              <a:t>3/31/2019</a:t>
             </a:fld>
             <a:endParaRPr lang="en-US"/>
           </a:p>
@@ -2724,7 +2725,7 @@
           <a:p>
             <a:fld id="{E28ACE04-117D-4890-80E4-254974542FBA}" type="datetimeFigureOut">
               <a:rPr lang="en-US" smtClean="0"/>
-              <a:t>3/30/2019</a:t>
+              <a:t>3/31/2019</a:t>
             </a:fld>
             <a:endParaRPr lang="en-US"/>
           </a:p>
@@ -3160,11 +3161,7 @@
             </a:r>
             <a:r>
               <a:rPr lang="en-US" dirty="0" smtClean="0"/>
-              <a:t>, Molly, </a:t>
-            </a:r>
-            <a:r>
-              <a:rPr lang="en-US" dirty="0" smtClean="0"/>
-              <a:t>Dale</a:t>
+              <a:t>, Molly, Dale</a:t>
             </a:r>
           </a:p>
           <a:p>
@@ -3757,7 +3754,46 @@
             <a:pPr lvl="2"/>
             <a:r>
               <a:rPr lang="en-US" dirty="0" smtClean="0"/>
-              <a:t>TBD, probably US Census</a:t>
+              <a:t>TBD, probably US </a:t>
+            </a:r>
+            <a:r>
+              <a:rPr lang="en-US" dirty="0" smtClean="0"/>
+              <a:t>Census</a:t>
+            </a:r>
+          </a:p>
+          <a:p>
+            <a:pPr lvl="1"/>
+            <a:r>
+              <a:rPr lang="en-US" dirty="0" smtClean="0"/>
+              <a:t>Had to install </a:t>
+            </a:r>
+            <a:r>
+              <a:rPr lang="en-US" b="1" dirty="0" err="1" smtClean="0">
+                <a:solidFill>
+                  <a:srgbClr val="00B050"/>
+                </a:solidFill>
+              </a:rPr>
+              <a:t>sodapy</a:t>
+            </a:r>
+            <a:r>
+              <a:rPr lang="en-US" dirty="0" smtClean="0">
+                <a:solidFill>
+                  <a:srgbClr val="00B050"/>
+                </a:solidFill>
+              </a:rPr>
+              <a:t> </a:t>
+            </a:r>
+            <a:r>
+              <a:rPr lang="en-US" dirty="0" smtClean="0"/>
+              <a:t>to use </a:t>
+            </a:r>
+            <a:r>
+              <a:rPr lang="en-US" dirty="0" err="1" smtClean="0"/>
+              <a:t>Socrata</a:t>
+            </a:r>
+            <a:r>
+              <a:rPr lang="en-US" dirty="0" smtClean="0"/>
+              <a:t> to get this</a:t>
             </a:r>
             <a:endParaRPr lang="en-US" dirty="0"/>
           </a:p>
@@ -4093,6 +4129,13 @@
   <p:clrMapOvr>
     <a:masterClrMapping/>
   </p:clrMapOvr>
+  <p:timing>
+    <p:tnLst>
+      <p:par>
+        <p:cTn id="1" dur="indefinite" restart="never" nodeType="tmRoot"/>
+      </p:par>
+    </p:tnLst>
+  </p:timing>
 </p:sld>
 </file>
 
@@ -5402,6 +5445,13 @@
   <p:clrMapOvr>
     <a:masterClrMapping/>
   </p:clrMapOvr>
+  <p:timing>
+    <p:tnLst>
+      <p:par>
+        <p:cTn id="1" dur="indefinite" restart="never" nodeType="tmRoot"/>
+      </p:par>
+    </p:tnLst>
+  </p:timing>
 </p:sld>
 </file>
 
@@ -5618,6 +5668,261 @@
     <p:extLst>
       <p:ext uri="{BB962C8B-B14F-4D97-AF65-F5344CB8AC3E}">
         <p14:creationId xmlns:p14="http://schemas.microsoft.com/office/powerpoint/2010/main" val="528307647"/>
+      </p:ext>
+    </p:extLst>
+  </p:cSld>
+  <p:clrMapOvr>
+    <a:masterClrMapping/>
+  </p:clrMapOvr>
+  <p:timing>
+    <p:tnLst>
+      <p:par>
+        <p:cTn id="1" dur="indefinite" restart="never" nodeType="tmRoot"/>
+      </p:par>
+    </p:tnLst>
+  </p:timing>
+</p:sld>
+</file>
+
+<file path=ppt/slides/slide6.xml><?xml version="1.0" encoding="utf-8"?>
+<p:sld xmlns:a="http://schemas.openxmlformats.org/drawingml/2006/main" xmlns:r="http://schemas.openxmlformats.org/officeDocument/2006/relationships" xmlns:p="http://schemas.openxmlformats.org/presentationml/2006/main">
+  <p:cSld>
+    <p:spTree>
+      <p:nvGrpSpPr>
+        <p:cNvPr id="1" name=""/>
+        <p:cNvGrpSpPr/>
+        <p:nvPr/>
+      </p:nvGrpSpPr>
+      <p:grpSpPr>
+        <a:xfrm>
+          <a:off x="0" y="0"/>
+          <a:ext cx="0" cy="0"/>
+          <a:chOff x="0" y="0"/>
+          <a:chExt cx="0" cy="0"/>
+        </a:xfrm>
+      </p:grpSpPr>
+      <p:sp>
+        <p:nvSpPr>
+          <p:cNvPr id="2" name="Title 1"/>
+          <p:cNvSpPr>
+            <a:spLocks noGrp="1"/>
+          </p:cNvSpPr>
+          <p:nvPr>
+            <p:ph type="title"/>
+          </p:nvPr>
+        </p:nvSpPr>
+        <p:spPr/>
+        <p:txBody>
+          <a:bodyPr/>
+          <a:lstStyle/>
+          <a:p>
+            <a:r>
+              <a:rPr lang="en-US" dirty="0" smtClean="0"/>
+              <a:t>Building the DB</a:t>
+            </a:r>
+            <a:endParaRPr lang="en-US" dirty="0"/>
+          </a:p>
+        </p:txBody>
+      </p:sp>
+      <p:sp>
+        <p:nvSpPr>
+          <p:cNvPr id="3" name="Content Placeholder 2"/>
+          <p:cNvSpPr>
+            <a:spLocks noGrp="1"/>
+          </p:cNvSpPr>
+          <p:nvPr>
+            <p:ph idx="1"/>
+          </p:nvPr>
+        </p:nvSpPr>
+        <p:spPr/>
+        <p:txBody>
+          <a:bodyPr>
+            <a:normAutofit fontScale="70000" lnSpcReduction="20000"/>
+          </a:bodyPr>
+          <a:lstStyle/>
+          <a:p>
+            <a:r>
+              <a:rPr lang="en-US" dirty="0" smtClean="0"/>
+              <a:t>We will build a </a:t>
+            </a:r>
+            <a:r>
+              <a:rPr lang="en-US" dirty="0" err="1" smtClean="0"/>
+              <a:t>mySQL</a:t>
+            </a:r>
+            <a:r>
+              <a:rPr lang="en-US" dirty="0" smtClean="0"/>
+              <a:t> </a:t>
+            </a:r>
+            <a:r>
+              <a:rPr lang="en-US" dirty="0" err="1" smtClean="0"/>
+              <a:t>db</a:t>
+            </a:r>
+            <a:r>
+              <a:rPr lang="en-US" dirty="0" smtClean="0"/>
+              <a:t> with two tables</a:t>
+            </a:r>
+          </a:p>
+          <a:p>
+            <a:pPr lvl="1"/>
+            <a:r>
+              <a:rPr lang="en-US" dirty="0" smtClean="0"/>
+              <a:t>Austin income by zip code</a:t>
+            </a:r>
+          </a:p>
+          <a:p>
+            <a:pPr lvl="2"/>
+            <a:r>
+              <a:rPr lang="en-US" dirty="0" smtClean="0"/>
+              <a:t>Scraped from </a:t>
+            </a:r>
+            <a:r>
+              <a:rPr lang="en-US" dirty="0" err="1" smtClean="0"/>
+              <a:t>zipatlas</a:t>
+            </a:r>
+            <a:endParaRPr lang="en-US" dirty="0" smtClean="0"/>
+          </a:p>
+          <a:p>
+            <a:pPr lvl="1"/>
+            <a:r>
+              <a:rPr lang="en-US" dirty="0" smtClean="0"/>
+              <a:t>Austin Animal Center</a:t>
+            </a:r>
+          </a:p>
+          <a:p>
+            <a:pPr lvl="2"/>
+            <a:r>
+              <a:rPr lang="en-US" dirty="0" smtClean="0"/>
+              <a:t>API interface at </a:t>
+            </a:r>
+            <a:r>
+              <a:rPr lang="en-US" u="sng" dirty="0" smtClean="0">
+                <a:hlinkClick r:id="rId2"/>
+              </a:rPr>
+              <a:t>data.austintexas.gov</a:t>
+            </a:r>
+            <a:endParaRPr lang="en-US" u="sng" dirty="0" smtClean="0"/>
+          </a:p>
+          <a:p>
+            <a:pPr lvl="2"/>
+            <a:r>
+              <a:rPr lang="en-US" dirty="0" smtClean="0"/>
+              <a:t>Must add zip code and </a:t>
+            </a:r>
+            <a:r>
+              <a:rPr lang="en-US" dirty="0" err="1" smtClean="0"/>
+              <a:t>lat</a:t>
+            </a:r>
+            <a:r>
+              <a:rPr lang="en-US" dirty="0" smtClean="0"/>
+              <a:t>/</a:t>
+            </a:r>
+            <a:r>
+              <a:rPr lang="en-US" dirty="0" err="1" smtClean="0"/>
+              <a:t>lon</a:t>
+            </a:r>
+            <a:r>
+              <a:rPr lang="en-US" dirty="0" smtClean="0"/>
+              <a:t> to this </a:t>
+            </a:r>
+            <a:r>
+              <a:rPr lang="en-US" dirty="0" err="1" smtClean="0"/>
+              <a:t>db</a:t>
+            </a:r>
+            <a:r>
+              <a:rPr lang="en-US" dirty="0" smtClean="0"/>
+              <a:t> by geocoding</a:t>
+            </a:r>
+          </a:p>
+          <a:p>
+            <a:r>
+              <a:rPr lang="en-US" dirty="0" smtClean="0"/>
+              <a:t>Data can then be merged by zip code or </a:t>
+            </a:r>
+            <a:r>
+              <a:rPr lang="en-US" dirty="0" err="1" smtClean="0"/>
+              <a:t>lat</a:t>
+            </a:r>
+            <a:r>
+              <a:rPr lang="en-US" dirty="0" smtClean="0"/>
+              <a:t>/</a:t>
+            </a:r>
+            <a:r>
+              <a:rPr lang="en-US" dirty="0" err="1" smtClean="0"/>
+              <a:t>lon</a:t>
+            </a:r>
+            <a:r>
+              <a:rPr lang="en-US" dirty="0" smtClean="0"/>
+              <a:t> to build the views we want to build</a:t>
+            </a:r>
+          </a:p>
+          <a:p>
+            <a:r>
+              <a:rPr lang="en-US" dirty="0" smtClean="0"/>
+              <a:t>In map view</a:t>
+            </a:r>
+          </a:p>
+          <a:p>
+            <a:pPr lvl="1"/>
+            <a:r>
+              <a:rPr lang="en-US" dirty="0" smtClean="0"/>
+              <a:t>Tags for locations must be </a:t>
+            </a:r>
+            <a:r>
+              <a:rPr lang="en-US" dirty="0" err="1" smtClean="0"/>
+              <a:t>lat</a:t>
+            </a:r>
+            <a:r>
+              <a:rPr lang="en-US" dirty="0" smtClean="0"/>
+              <a:t>/</a:t>
+            </a:r>
+            <a:r>
+              <a:rPr lang="en-US" dirty="0" err="1" smtClean="0"/>
+              <a:t>lon</a:t>
+            </a:r>
+            <a:endParaRPr lang="en-US" dirty="0" smtClean="0"/>
+          </a:p>
+          <a:p>
+            <a:pPr lvl="1"/>
+            <a:r>
+              <a:rPr lang="en-US" dirty="0" smtClean="0"/>
+              <a:t>Zip code level polygons on map</a:t>
+            </a:r>
+          </a:p>
+          <a:p>
+            <a:pPr lvl="1"/>
+            <a:r>
+              <a:rPr lang="en-US" dirty="0" smtClean="0"/>
+              <a:t>Polygons to be colored by user choice</a:t>
+            </a:r>
+          </a:p>
+          <a:p>
+            <a:pPr lvl="2"/>
+            <a:r>
+              <a:rPr lang="en-US" dirty="0" smtClean="0"/>
+              <a:t>Income (probably heat map style)</a:t>
+            </a:r>
+          </a:p>
+          <a:p>
+            <a:pPr lvl="2"/>
+            <a:r>
+              <a:rPr lang="en-US" dirty="0" smtClean="0"/>
+              <a:t># of intake</a:t>
+            </a:r>
+          </a:p>
+          <a:p>
+            <a:pPr lvl="2"/>
+            <a:r>
+              <a:rPr lang="en-US" dirty="0" smtClean="0"/>
+              <a:t># of outtake</a:t>
+            </a:r>
+            <a:endParaRPr lang="en-US" dirty="0"/>
+          </a:p>
+        </p:txBody>
+      </p:sp>
+    </p:spTree>
+    <p:extLst>
+      <p:ext uri="{BB962C8B-B14F-4D97-AF65-F5344CB8AC3E}">
+        <p14:creationId xmlns:p14="http://schemas.microsoft.com/office/powerpoint/2010/main" val="3427327151"/>
       </p:ext>
     </p:extLst>
   </p:cSld>

</xml_diff>